<commit_message>
Observer Pattern en ppt - teoría
</commit_message>
<xml_diff>
--- a/Anotaciones.pptx
+++ b/Anotaciones.pptx
@@ -11,6 +11,15 @@
     <p:sldId id="259" r:id="rId5"/>
     <p:sldId id="260" r:id="rId6"/>
     <p:sldId id="261" r:id="rId7"/>
+    <p:sldId id="262" r:id="rId8"/>
+    <p:sldId id="263" r:id="rId9"/>
+    <p:sldId id="264" r:id="rId10"/>
+    <p:sldId id="265" r:id="rId11"/>
+    <p:sldId id="266" r:id="rId12"/>
+    <p:sldId id="267" r:id="rId13"/>
+    <p:sldId id="268" r:id="rId14"/>
+    <p:sldId id="269" r:id="rId15"/>
+    <p:sldId id="270" r:id="rId16"/>
   </p:sldIdLst>
   <p:sldSz cx="12192000" cy="6858000"/>
   <p:notesSz cx="6858000" cy="9144000"/>
@@ -109,6 +118,11 @@
       </a:defRPr>
     </a:lvl9pPr>
   </p:defaultTextStyle>
+  <p:extLst>
+    <p:ext uri="{EFAFB233-063F-42B5-8137-9DF3F51BA10A}">
+      <p15:sldGuideLst xmlns:p15="http://schemas.microsoft.com/office/powerpoint/2012/main"/>
+    </p:ext>
+  </p:extLst>
 </p:presentation>
 </file>
 
@@ -261,7 +275,7 @@
           <a:p>
             <a:fld id="{EDF5EDB8-3344-4664-96F4-7A20BDBEC90F}" type="datetimeFigureOut">
               <a:rPr lang="en-GB" smtClean="0"/>
-              <a:t>17/11/2020</a:t>
+              <a:t>25/11/2020</a:t>
             </a:fld>
             <a:endParaRPr lang="en-GB"/>
           </a:p>
@@ -461,7 +475,7 @@
           <a:p>
             <a:fld id="{EDF5EDB8-3344-4664-96F4-7A20BDBEC90F}" type="datetimeFigureOut">
               <a:rPr lang="en-GB" smtClean="0"/>
-              <a:t>17/11/2020</a:t>
+              <a:t>25/11/2020</a:t>
             </a:fld>
             <a:endParaRPr lang="en-GB"/>
           </a:p>
@@ -671,7 +685,7 @@
           <a:p>
             <a:fld id="{EDF5EDB8-3344-4664-96F4-7A20BDBEC90F}" type="datetimeFigureOut">
               <a:rPr lang="en-GB" smtClean="0"/>
-              <a:t>17/11/2020</a:t>
+              <a:t>25/11/2020</a:t>
             </a:fld>
             <a:endParaRPr lang="en-GB"/>
           </a:p>
@@ -871,7 +885,7 @@
           <a:p>
             <a:fld id="{EDF5EDB8-3344-4664-96F4-7A20BDBEC90F}" type="datetimeFigureOut">
               <a:rPr lang="en-GB" smtClean="0"/>
-              <a:t>17/11/2020</a:t>
+              <a:t>25/11/2020</a:t>
             </a:fld>
             <a:endParaRPr lang="en-GB"/>
           </a:p>
@@ -1147,7 +1161,7 @@
           <a:p>
             <a:fld id="{EDF5EDB8-3344-4664-96F4-7A20BDBEC90F}" type="datetimeFigureOut">
               <a:rPr lang="en-GB" smtClean="0"/>
-              <a:t>17/11/2020</a:t>
+              <a:t>25/11/2020</a:t>
             </a:fld>
             <a:endParaRPr lang="en-GB"/>
           </a:p>
@@ -1415,7 +1429,7 @@
           <a:p>
             <a:fld id="{EDF5EDB8-3344-4664-96F4-7A20BDBEC90F}" type="datetimeFigureOut">
               <a:rPr lang="en-GB" smtClean="0"/>
-              <a:t>17/11/2020</a:t>
+              <a:t>25/11/2020</a:t>
             </a:fld>
             <a:endParaRPr lang="en-GB"/>
           </a:p>
@@ -1830,7 +1844,7 @@
           <a:p>
             <a:fld id="{EDF5EDB8-3344-4664-96F4-7A20BDBEC90F}" type="datetimeFigureOut">
               <a:rPr lang="en-GB" smtClean="0"/>
-              <a:t>17/11/2020</a:t>
+              <a:t>25/11/2020</a:t>
             </a:fld>
             <a:endParaRPr lang="en-GB"/>
           </a:p>
@@ -1972,7 +1986,7 @@
           <a:p>
             <a:fld id="{EDF5EDB8-3344-4664-96F4-7A20BDBEC90F}" type="datetimeFigureOut">
               <a:rPr lang="en-GB" smtClean="0"/>
-              <a:t>17/11/2020</a:t>
+              <a:t>25/11/2020</a:t>
             </a:fld>
             <a:endParaRPr lang="en-GB"/>
           </a:p>
@@ -2085,7 +2099,7 @@
           <a:p>
             <a:fld id="{EDF5EDB8-3344-4664-96F4-7A20BDBEC90F}" type="datetimeFigureOut">
               <a:rPr lang="en-GB" smtClean="0"/>
-              <a:t>17/11/2020</a:t>
+              <a:t>25/11/2020</a:t>
             </a:fld>
             <a:endParaRPr lang="en-GB"/>
           </a:p>
@@ -2398,7 +2412,7 @@
           <a:p>
             <a:fld id="{EDF5EDB8-3344-4664-96F4-7A20BDBEC90F}" type="datetimeFigureOut">
               <a:rPr lang="en-GB" smtClean="0"/>
-              <a:t>17/11/2020</a:t>
+              <a:t>25/11/2020</a:t>
             </a:fld>
             <a:endParaRPr lang="en-GB"/>
           </a:p>
@@ -2687,7 +2701,7 @@
           <a:p>
             <a:fld id="{EDF5EDB8-3344-4664-96F4-7A20BDBEC90F}" type="datetimeFigureOut">
               <a:rPr lang="en-GB" smtClean="0"/>
-              <a:t>17/11/2020</a:t>
+              <a:t>25/11/2020</a:t>
             </a:fld>
             <a:endParaRPr lang="en-GB"/>
           </a:p>
@@ -2930,7 +2944,7 @@
           <a:p>
             <a:fld id="{EDF5EDB8-3344-4664-96F4-7A20BDBEC90F}" type="datetimeFigureOut">
               <a:rPr lang="en-GB" smtClean="0"/>
-              <a:t>17/11/2020</a:t>
+              <a:t>25/11/2020</a:t>
             </a:fld>
             <a:endParaRPr lang="en-GB"/>
           </a:p>
@@ -3407,6 +3421,1150 @@
 </p:sld>
 </file>
 
+<file path=ppt/slides/slide10.xml><?xml version="1.0" encoding="utf-8"?>
+<p:sld xmlns:a="http://schemas.openxmlformats.org/drawingml/2006/main" xmlns:r="http://schemas.openxmlformats.org/officeDocument/2006/relationships" xmlns:p="http://schemas.openxmlformats.org/presentationml/2006/main">
+  <p:cSld>
+    <p:spTree>
+      <p:nvGrpSpPr>
+        <p:cNvPr id="1" name=""/>
+        <p:cNvGrpSpPr/>
+        <p:nvPr/>
+      </p:nvGrpSpPr>
+      <p:grpSpPr>
+        <a:xfrm>
+          <a:off x="0" y="0"/>
+          <a:ext cx="0" cy="0"/>
+          <a:chOff x="0" y="0"/>
+          <a:chExt cx="0" cy="0"/>
+        </a:xfrm>
+      </p:grpSpPr>
+      <p:sp>
+        <p:nvSpPr>
+          <p:cNvPr id="3" name="Rectangle 2">
+            <a:extLst>
+              <a:ext uri="{FF2B5EF4-FFF2-40B4-BE49-F238E27FC236}">
+                <a16:creationId xmlns:a16="http://schemas.microsoft.com/office/drawing/2014/main" id="{0A07BF98-BFAC-4EB3-8EF0-9B3C05073DF1}"/>
+              </a:ext>
+            </a:extLst>
+          </p:cNvPr>
+          <p:cNvSpPr/>
+          <p:nvPr/>
+        </p:nvSpPr>
+        <p:spPr>
+          <a:xfrm>
+            <a:off x="410900" y="491421"/>
+            <a:ext cx="4983480" cy="923330"/>
+          </a:xfrm>
+          <a:prstGeom prst="rect">
+            <a:avLst/>
+          </a:prstGeom>
+          <a:noFill/>
+        </p:spPr>
+        <p:txBody>
+          <a:bodyPr wrap="none" lIns="91440" tIns="45720" rIns="91440" bIns="45720">
+            <a:spAutoFit/>
+          </a:bodyPr>
+          <a:lstStyle/>
+          <a:p>
+            <a:pPr algn="ctr"/>
+            <a:r>
+              <a:rPr lang="en-US" sz="5400" b="0" cap="none" spc="0" dirty="0">
+                <a:ln w="0"/>
+                <a:solidFill>
+                  <a:schemeClr val="tx1"/>
+                </a:solidFill>
+                <a:effectLst>
+                  <a:outerShdw blurRad="38100" dist="19050" dir="2700000" algn="tl" rotWithShape="0">
+                    <a:schemeClr val="dk1">
+                      <a:alpha val="40000"/>
+                    </a:schemeClr>
+                  </a:outerShdw>
+                </a:effectLst>
+              </a:rPr>
+              <a:t>Observer Pattern</a:t>
+            </a:r>
+          </a:p>
+        </p:txBody>
+      </p:sp>
+      <p:pic>
+        <p:nvPicPr>
+          <p:cNvPr id="5" name="Picture 4">
+            <a:extLst>
+              <a:ext uri="{FF2B5EF4-FFF2-40B4-BE49-F238E27FC236}">
+                <a16:creationId xmlns:a16="http://schemas.microsoft.com/office/drawing/2014/main" id="{D6C67D76-CA20-4049-9CBD-E5CFE45C28A9}"/>
+              </a:ext>
+            </a:extLst>
+          </p:cNvPr>
+          <p:cNvPicPr>
+            <a:picLocks noChangeAspect="1"/>
+          </p:cNvPicPr>
+          <p:nvPr/>
+        </p:nvPicPr>
+        <p:blipFill>
+          <a:blip r:embed="rId2"/>
+          <a:stretch>
+            <a:fillRect/>
+          </a:stretch>
+        </p:blipFill>
+        <p:spPr>
+          <a:xfrm>
+            <a:off x="2316159" y="1414751"/>
+            <a:ext cx="7559681" cy="5317975"/>
+          </a:xfrm>
+          <a:prstGeom prst="rect">
+            <a:avLst/>
+          </a:prstGeom>
+        </p:spPr>
+      </p:pic>
+    </p:spTree>
+    <p:extLst>
+      <p:ext uri="{BB962C8B-B14F-4D97-AF65-F5344CB8AC3E}">
+        <p14:creationId xmlns:p14="http://schemas.microsoft.com/office/powerpoint/2010/main" val="1387724192"/>
+      </p:ext>
+    </p:extLst>
+  </p:cSld>
+  <p:clrMapOvr>
+    <a:masterClrMapping/>
+  </p:clrMapOvr>
+</p:sld>
+</file>
+
+<file path=ppt/slides/slide11.xml><?xml version="1.0" encoding="utf-8"?>
+<p:sld xmlns:a="http://schemas.openxmlformats.org/drawingml/2006/main" xmlns:r="http://schemas.openxmlformats.org/officeDocument/2006/relationships" xmlns:p="http://schemas.openxmlformats.org/presentationml/2006/main">
+  <p:cSld>
+    <p:spTree>
+      <p:nvGrpSpPr>
+        <p:cNvPr id="1" name=""/>
+        <p:cNvGrpSpPr/>
+        <p:nvPr/>
+      </p:nvGrpSpPr>
+      <p:grpSpPr>
+        <a:xfrm>
+          <a:off x="0" y="0"/>
+          <a:ext cx="0" cy="0"/>
+          <a:chOff x="0" y="0"/>
+          <a:chExt cx="0" cy="0"/>
+        </a:xfrm>
+      </p:grpSpPr>
+      <p:sp>
+        <p:nvSpPr>
+          <p:cNvPr id="3" name="Rectangle 2">
+            <a:extLst>
+              <a:ext uri="{FF2B5EF4-FFF2-40B4-BE49-F238E27FC236}">
+                <a16:creationId xmlns:a16="http://schemas.microsoft.com/office/drawing/2014/main" id="{79997FF2-7769-45A4-896D-F73FACBE7C47}"/>
+              </a:ext>
+            </a:extLst>
+          </p:cNvPr>
+          <p:cNvSpPr/>
+          <p:nvPr/>
+        </p:nvSpPr>
+        <p:spPr>
+          <a:xfrm>
+            <a:off x="410900" y="491421"/>
+            <a:ext cx="4983480" cy="923330"/>
+          </a:xfrm>
+          <a:prstGeom prst="rect">
+            <a:avLst/>
+          </a:prstGeom>
+          <a:noFill/>
+        </p:spPr>
+        <p:txBody>
+          <a:bodyPr wrap="none" lIns="91440" tIns="45720" rIns="91440" bIns="45720">
+            <a:spAutoFit/>
+          </a:bodyPr>
+          <a:lstStyle/>
+          <a:p>
+            <a:pPr algn="ctr"/>
+            <a:r>
+              <a:rPr lang="en-US" sz="5400" b="0" cap="none" spc="0" dirty="0">
+                <a:ln w="0"/>
+                <a:solidFill>
+                  <a:schemeClr val="tx1"/>
+                </a:solidFill>
+                <a:effectLst>
+                  <a:outerShdw blurRad="38100" dist="19050" dir="2700000" algn="tl" rotWithShape="0">
+                    <a:schemeClr val="dk1">
+                      <a:alpha val="40000"/>
+                    </a:schemeClr>
+                  </a:outerShdw>
+                </a:effectLst>
+              </a:rPr>
+              <a:t>Observer Pattern</a:t>
+            </a:r>
+          </a:p>
+        </p:txBody>
+      </p:sp>
+      <p:sp>
+        <p:nvSpPr>
+          <p:cNvPr id="4" name="TextBox 3">
+            <a:extLst>
+              <a:ext uri="{FF2B5EF4-FFF2-40B4-BE49-F238E27FC236}">
+                <a16:creationId xmlns:a16="http://schemas.microsoft.com/office/drawing/2014/main" id="{08A04AD3-6DB0-461D-B7E6-804FE13CE8B6}"/>
+              </a:ext>
+            </a:extLst>
+          </p:cNvPr>
+          <p:cNvSpPr txBox="1"/>
+          <p:nvPr/>
+        </p:nvSpPr>
+        <p:spPr>
+          <a:xfrm>
+            <a:off x="731520" y="1842868"/>
+            <a:ext cx="10846191" cy="1200329"/>
+          </a:xfrm>
+          <a:prstGeom prst="rect">
+            <a:avLst/>
+          </a:prstGeom>
+          <a:solidFill>
+            <a:schemeClr val="bg2"/>
+          </a:solidFill>
+          <a:ln>
+            <a:solidFill>
+              <a:schemeClr val="tx1"/>
+            </a:solidFill>
+          </a:ln>
+        </p:spPr>
+        <p:txBody>
+          <a:bodyPr wrap="square" rtlCol="0">
+            <a:spAutoFit/>
+          </a:bodyPr>
+          <a:lstStyle/>
+          <a:p>
+            <a:r>
+              <a:rPr lang="en-GB" sz="2400" b="1" dirty="0">
+                <a:latin typeface="Gill Sans Nova" panose="020B0604020202020204" pitchFamily="34" charset="0"/>
+              </a:rPr>
+              <a:t>The Observer Pattern deﬁnes a one-to-many dependency between objects so that when one object changes state, all of its dependents are notiﬁed and updated automatically.</a:t>
+            </a:r>
+            <a:endParaRPr lang="en-US" sz="2400" b="1" dirty="0">
+              <a:latin typeface="Gill Sans Nova" panose="020B0604020202020204" pitchFamily="34" charset="0"/>
+            </a:endParaRPr>
+          </a:p>
+        </p:txBody>
+      </p:sp>
+      <p:pic>
+        <p:nvPicPr>
+          <p:cNvPr id="2" name="Picture 1">
+            <a:extLst>
+              <a:ext uri="{FF2B5EF4-FFF2-40B4-BE49-F238E27FC236}">
+                <a16:creationId xmlns:a16="http://schemas.microsoft.com/office/drawing/2014/main" id="{1BA0893D-521C-42CF-8114-38A082063814}"/>
+              </a:ext>
+            </a:extLst>
+          </p:cNvPr>
+          <p:cNvPicPr>
+            <a:picLocks noChangeAspect="1"/>
+          </p:cNvPicPr>
+          <p:nvPr/>
+        </p:nvPicPr>
+        <p:blipFill>
+          <a:blip r:embed="rId2"/>
+          <a:stretch>
+            <a:fillRect/>
+          </a:stretch>
+        </p:blipFill>
+        <p:spPr>
+          <a:xfrm>
+            <a:off x="6353909" y="3235569"/>
+            <a:ext cx="5223802" cy="3545058"/>
+          </a:xfrm>
+          <a:prstGeom prst="rect">
+            <a:avLst/>
+          </a:prstGeom>
+        </p:spPr>
+      </p:pic>
+      <p:sp>
+        <p:nvSpPr>
+          <p:cNvPr id="7" name="TextBox 6">
+            <a:extLst>
+              <a:ext uri="{FF2B5EF4-FFF2-40B4-BE49-F238E27FC236}">
+                <a16:creationId xmlns:a16="http://schemas.microsoft.com/office/drawing/2014/main" id="{2D366707-35A1-45FE-99D7-CDE2002309BE}"/>
+              </a:ext>
+            </a:extLst>
+          </p:cNvPr>
+          <p:cNvSpPr txBox="1"/>
+          <p:nvPr/>
+        </p:nvSpPr>
+        <p:spPr>
+          <a:xfrm>
+            <a:off x="731520" y="3235569"/>
+            <a:ext cx="4662860" cy="2246769"/>
+          </a:xfrm>
+          <a:prstGeom prst="rect">
+            <a:avLst/>
+          </a:prstGeom>
+          <a:noFill/>
+        </p:spPr>
+        <p:txBody>
+          <a:bodyPr wrap="square">
+            <a:spAutoFit/>
+          </a:bodyPr>
+          <a:lstStyle/>
+          <a:p>
+            <a:r>
+              <a:rPr lang="en-GB" sz="2000" dirty="0">
+                <a:latin typeface="Gill Sans Nova" panose="020B0602020104020203" pitchFamily="34" charset="0"/>
+              </a:rPr>
+              <a:t>The subject and observers define the one-to-many relationship. The observers are dependent on the subject such that when the subject’s state changes, the observers get notified.  Depending on the style of notification, the observer may also be updated with new values. </a:t>
+            </a:r>
+          </a:p>
+        </p:txBody>
+      </p:sp>
+    </p:spTree>
+    <p:extLst>
+      <p:ext uri="{BB962C8B-B14F-4D97-AF65-F5344CB8AC3E}">
+        <p14:creationId xmlns:p14="http://schemas.microsoft.com/office/powerpoint/2010/main" val="808881346"/>
+      </p:ext>
+    </p:extLst>
+  </p:cSld>
+  <p:clrMapOvr>
+    <a:masterClrMapping/>
+  </p:clrMapOvr>
+</p:sld>
+</file>
+
+<file path=ppt/slides/slide12.xml><?xml version="1.0" encoding="utf-8"?>
+<p:sld xmlns:a="http://schemas.openxmlformats.org/drawingml/2006/main" xmlns:r="http://schemas.openxmlformats.org/officeDocument/2006/relationships" xmlns:p="http://schemas.openxmlformats.org/presentationml/2006/main">
+  <p:cSld>
+    <p:spTree>
+      <p:nvGrpSpPr>
+        <p:cNvPr id="1" name=""/>
+        <p:cNvGrpSpPr/>
+        <p:nvPr/>
+      </p:nvGrpSpPr>
+      <p:grpSpPr>
+        <a:xfrm>
+          <a:off x="0" y="0"/>
+          <a:ext cx="0" cy="0"/>
+          <a:chOff x="0" y="0"/>
+          <a:chExt cx="0" cy="0"/>
+        </a:xfrm>
+      </p:grpSpPr>
+      <p:pic>
+        <p:nvPicPr>
+          <p:cNvPr id="6" name="Picture 5">
+            <a:extLst>
+              <a:ext uri="{FF2B5EF4-FFF2-40B4-BE49-F238E27FC236}">
+                <a16:creationId xmlns:a16="http://schemas.microsoft.com/office/drawing/2014/main" id="{3200FF9E-0674-4EBE-9CC0-F0D6ACB62E0A}"/>
+              </a:ext>
+            </a:extLst>
+          </p:cNvPr>
+          <p:cNvPicPr>
+            <a:picLocks noChangeAspect="1"/>
+          </p:cNvPicPr>
+          <p:nvPr/>
+        </p:nvPicPr>
+        <p:blipFill>
+          <a:blip r:embed="rId2"/>
+          <a:stretch>
+            <a:fillRect/>
+          </a:stretch>
+        </p:blipFill>
+        <p:spPr>
+          <a:xfrm>
+            <a:off x="1425526" y="72824"/>
+            <a:ext cx="9340948" cy="6712352"/>
+          </a:xfrm>
+          <a:prstGeom prst="rect">
+            <a:avLst/>
+          </a:prstGeom>
+        </p:spPr>
+      </p:pic>
+    </p:spTree>
+    <p:extLst>
+      <p:ext uri="{BB962C8B-B14F-4D97-AF65-F5344CB8AC3E}">
+        <p14:creationId xmlns:p14="http://schemas.microsoft.com/office/powerpoint/2010/main" val="316809047"/>
+      </p:ext>
+    </p:extLst>
+  </p:cSld>
+  <p:clrMapOvr>
+    <a:masterClrMapping/>
+  </p:clrMapOvr>
+</p:sld>
+</file>
+
+<file path=ppt/slides/slide13.xml><?xml version="1.0" encoding="utf-8"?>
+<p:sld xmlns:a="http://schemas.openxmlformats.org/drawingml/2006/main" xmlns:r="http://schemas.openxmlformats.org/officeDocument/2006/relationships" xmlns:p="http://schemas.openxmlformats.org/presentationml/2006/main">
+  <p:cSld>
+    <p:spTree>
+      <p:nvGrpSpPr>
+        <p:cNvPr id="1" name=""/>
+        <p:cNvGrpSpPr/>
+        <p:nvPr/>
+      </p:nvGrpSpPr>
+      <p:grpSpPr>
+        <a:xfrm>
+          <a:off x="0" y="0"/>
+          <a:ext cx="0" cy="0"/>
+          <a:chOff x="0" y="0"/>
+          <a:chExt cx="0" cy="0"/>
+        </a:xfrm>
+      </p:grpSpPr>
+      <p:sp>
+        <p:nvSpPr>
+          <p:cNvPr id="2" name="Rectangle 1">
+            <a:extLst>
+              <a:ext uri="{FF2B5EF4-FFF2-40B4-BE49-F238E27FC236}">
+                <a16:creationId xmlns:a16="http://schemas.microsoft.com/office/drawing/2014/main" id="{40F36743-940F-4F7C-9825-27EA6B2B4427}"/>
+              </a:ext>
+            </a:extLst>
+          </p:cNvPr>
+          <p:cNvSpPr/>
+          <p:nvPr/>
+        </p:nvSpPr>
+        <p:spPr>
+          <a:xfrm>
+            <a:off x="164361" y="466802"/>
+            <a:ext cx="8346388" cy="923330"/>
+          </a:xfrm>
+          <a:prstGeom prst="rect">
+            <a:avLst/>
+          </a:prstGeom>
+          <a:noFill/>
+        </p:spPr>
+        <p:txBody>
+          <a:bodyPr wrap="none" lIns="91440" tIns="45720" rIns="91440" bIns="45720">
+            <a:spAutoFit/>
+          </a:bodyPr>
+          <a:lstStyle/>
+          <a:p>
+            <a:pPr algn="ctr"/>
+            <a:r>
+              <a:rPr lang="en-US" sz="5400" b="0" cap="none" spc="0" dirty="0">
+                <a:ln w="0"/>
+                <a:solidFill>
+                  <a:schemeClr val="tx1"/>
+                </a:solidFill>
+                <a:effectLst>
+                  <a:outerShdw blurRad="38100" dist="19050" dir="2700000" algn="tl" rotWithShape="0">
+                    <a:schemeClr val="dk1">
+                      <a:alpha val="40000"/>
+                    </a:schemeClr>
+                  </a:outerShdw>
+                </a:effectLst>
+              </a:rPr>
+              <a:t>The power of Loose Coupling</a:t>
+            </a:r>
+          </a:p>
+        </p:txBody>
+      </p:sp>
+      <p:sp>
+        <p:nvSpPr>
+          <p:cNvPr id="3" name="TextBox 2">
+            <a:extLst>
+              <a:ext uri="{FF2B5EF4-FFF2-40B4-BE49-F238E27FC236}">
+                <a16:creationId xmlns:a16="http://schemas.microsoft.com/office/drawing/2014/main" id="{A6A1403E-B55E-4B74-8A50-D23A81CBCFD7}"/>
+              </a:ext>
+            </a:extLst>
+          </p:cNvPr>
+          <p:cNvSpPr txBox="1"/>
+          <p:nvPr/>
+        </p:nvSpPr>
+        <p:spPr>
+          <a:xfrm>
+            <a:off x="3323492" y="3249640"/>
+            <a:ext cx="5545015" cy="1631216"/>
+          </a:xfrm>
+          <a:prstGeom prst="rect">
+            <a:avLst/>
+          </a:prstGeom>
+          <a:noFill/>
+          <a:ln>
+            <a:solidFill>
+              <a:schemeClr val="tx1"/>
+            </a:solidFill>
+          </a:ln>
+        </p:spPr>
+        <p:txBody>
+          <a:bodyPr wrap="square">
+            <a:spAutoFit/>
+          </a:bodyPr>
+          <a:lstStyle/>
+          <a:p>
+            <a:pPr algn="ctr"/>
+            <a:r>
+              <a:rPr lang="en-GB" sz="2000" b="1" dirty="0">
+                <a:latin typeface="Gill Sans Nova" panose="020B0602020104020203" pitchFamily="34" charset="0"/>
+              </a:rPr>
+              <a:t>When two objects are loosely coupled, they can interact, but have very little knowledge of each other. The Observer Pattern provides an object design where subjects and observers are loosely coupled.</a:t>
+            </a:r>
+          </a:p>
+        </p:txBody>
+      </p:sp>
+      <p:sp>
+        <p:nvSpPr>
+          <p:cNvPr id="5" name="Rectangle 4">
+            <a:extLst>
+              <a:ext uri="{FF2B5EF4-FFF2-40B4-BE49-F238E27FC236}">
+                <a16:creationId xmlns:a16="http://schemas.microsoft.com/office/drawing/2014/main" id="{99A8BABF-C360-4005-A344-858A881055FB}"/>
+              </a:ext>
+            </a:extLst>
+          </p:cNvPr>
+          <p:cNvSpPr/>
+          <p:nvPr/>
+        </p:nvSpPr>
+        <p:spPr>
+          <a:xfrm>
+            <a:off x="1629507" y="1656946"/>
+            <a:ext cx="2307101" cy="1406770"/>
+          </a:xfrm>
+          <a:prstGeom prst="rect">
+            <a:avLst/>
+          </a:prstGeom>
+          <a:ln>
+            <a:solidFill>
+              <a:schemeClr val="tx1"/>
+            </a:solidFill>
+          </a:ln>
+        </p:spPr>
+        <p:style>
+          <a:lnRef idx="2">
+            <a:schemeClr val="accent6"/>
+          </a:lnRef>
+          <a:fillRef idx="1">
+            <a:schemeClr val="lt1"/>
+          </a:fillRef>
+          <a:effectRef idx="0">
+            <a:schemeClr val="accent6"/>
+          </a:effectRef>
+          <a:fontRef idx="minor">
+            <a:schemeClr val="dk1"/>
+          </a:fontRef>
+        </p:style>
+        <p:txBody>
+          <a:bodyPr rtlCol="0" anchor="ctr"/>
+          <a:lstStyle/>
+          <a:p>
+            <a:pPr algn="ctr"/>
+            <a:r>
+              <a:rPr lang="en-GB" dirty="0">
+                <a:latin typeface="Gill Sans Nova" panose="020B0602020104020203" pitchFamily="34" charset="0"/>
+              </a:rPr>
+              <a:t>The only thing the subject knows about an observer is that it implements a certain interface.</a:t>
+            </a:r>
+          </a:p>
+        </p:txBody>
+      </p:sp>
+      <p:sp>
+        <p:nvSpPr>
+          <p:cNvPr id="6" name="Rectangle 5">
+            <a:extLst>
+              <a:ext uri="{FF2B5EF4-FFF2-40B4-BE49-F238E27FC236}">
+                <a16:creationId xmlns:a16="http://schemas.microsoft.com/office/drawing/2014/main" id="{B36CA940-2A9A-4DB8-AF9B-2E4490C45701}"/>
+              </a:ext>
+            </a:extLst>
+          </p:cNvPr>
+          <p:cNvSpPr/>
+          <p:nvPr/>
+        </p:nvSpPr>
+        <p:spPr>
+          <a:xfrm>
+            <a:off x="8227256" y="1631852"/>
+            <a:ext cx="2307101" cy="1406770"/>
+          </a:xfrm>
+          <a:prstGeom prst="rect">
+            <a:avLst/>
+          </a:prstGeom>
+          <a:ln>
+            <a:solidFill>
+              <a:schemeClr val="tx1"/>
+            </a:solidFill>
+          </a:ln>
+        </p:spPr>
+        <p:style>
+          <a:lnRef idx="2">
+            <a:schemeClr val="accent6"/>
+          </a:lnRef>
+          <a:fillRef idx="1">
+            <a:schemeClr val="lt1"/>
+          </a:fillRef>
+          <a:effectRef idx="0">
+            <a:schemeClr val="accent6"/>
+          </a:effectRef>
+          <a:fontRef idx="minor">
+            <a:schemeClr val="dk1"/>
+          </a:fontRef>
+        </p:style>
+        <p:txBody>
+          <a:bodyPr rtlCol="0" anchor="ctr"/>
+          <a:lstStyle/>
+          <a:p>
+            <a:pPr algn="ctr"/>
+            <a:r>
+              <a:rPr lang="en-GB" dirty="0">
+                <a:latin typeface="Gill Sans Nova" panose="020B0602020104020203" pitchFamily="34" charset="0"/>
+              </a:rPr>
+              <a:t>We can add new observers at any time.</a:t>
+            </a:r>
+          </a:p>
+        </p:txBody>
+      </p:sp>
+      <p:sp>
+        <p:nvSpPr>
+          <p:cNvPr id="7" name="Rectangle 6">
+            <a:extLst>
+              <a:ext uri="{FF2B5EF4-FFF2-40B4-BE49-F238E27FC236}">
+                <a16:creationId xmlns:a16="http://schemas.microsoft.com/office/drawing/2014/main" id="{93547091-C26C-4B49-9701-AA9788441384}"/>
+              </a:ext>
+            </a:extLst>
+          </p:cNvPr>
+          <p:cNvSpPr/>
+          <p:nvPr/>
+        </p:nvSpPr>
+        <p:spPr>
+          <a:xfrm>
+            <a:off x="1573236" y="5066780"/>
+            <a:ext cx="2307101" cy="1406770"/>
+          </a:xfrm>
+          <a:prstGeom prst="rect">
+            <a:avLst/>
+          </a:prstGeom>
+          <a:ln>
+            <a:solidFill>
+              <a:schemeClr val="tx1"/>
+            </a:solidFill>
+          </a:ln>
+        </p:spPr>
+        <p:style>
+          <a:lnRef idx="2">
+            <a:schemeClr val="accent6"/>
+          </a:lnRef>
+          <a:fillRef idx="1">
+            <a:schemeClr val="lt1"/>
+          </a:fillRef>
+          <a:effectRef idx="0">
+            <a:schemeClr val="accent6"/>
+          </a:effectRef>
+          <a:fontRef idx="minor">
+            <a:schemeClr val="dk1"/>
+          </a:fontRef>
+        </p:style>
+        <p:txBody>
+          <a:bodyPr rtlCol="0" anchor="ctr"/>
+          <a:lstStyle/>
+          <a:p>
+            <a:pPr algn="ctr"/>
+            <a:r>
+              <a:rPr lang="en-GB" dirty="0">
+                <a:latin typeface="Gill Sans Nova" panose="020B0602020104020203" pitchFamily="34" charset="0"/>
+              </a:rPr>
+              <a:t>We never need to modify the subject to add new types of observers.</a:t>
+            </a:r>
+          </a:p>
+        </p:txBody>
+      </p:sp>
+      <p:sp>
+        <p:nvSpPr>
+          <p:cNvPr id="8" name="Rectangle 7">
+            <a:extLst>
+              <a:ext uri="{FF2B5EF4-FFF2-40B4-BE49-F238E27FC236}">
+                <a16:creationId xmlns:a16="http://schemas.microsoft.com/office/drawing/2014/main" id="{96D98A92-E60A-4EF9-A12C-27132B286BC6}"/>
+              </a:ext>
+            </a:extLst>
+          </p:cNvPr>
+          <p:cNvSpPr/>
+          <p:nvPr/>
+        </p:nvSpPr>
+        <p:spPr>
+          <a:xfrm>
+            <a:off x="8168639" y="5066780"/>
+            <a:ext cx="2307101" cy="1406770"/>
+          </a:xfrm>
+          <a:prstGeom prst="rect">
+            <a:avLst/>
+          </a:prstGeom>
+          <a:ln>
+            <a:solidFill>
+              <a:schemeClr val="tx1"/>
+            </a:solidFill>
+          </a:ln>
+        </p:spPr>
+        <p:style>
+          <a:lnRef idx="2">
+            <a:schemeClr val="accent6"/>
+          </a:lnRef>
+          <a:fillRef idx="1">
+            <a:schemeClr val="lt1"/>
+          </a:fillRef>
+          <a:effectRef idx="0">
+            <a:schemeClr val="accent6"/>
+          </a:effectRef>
+          <a:fontRef idx="minor">
+            <a:schemeClr val="dk1"/>
+          </a:fontRef>
+        </p:style>
+        <p:txBody>
+          <a:bodyPr rtlCol="0" anchor="ctr"/>
+          <a:lstStyle/>
+          <a:p>
+            <a:pPr algn="ctr"/>
+            <a:r>
+              <a:rPr lang="en-GB" dirty="0">
+                <a:latin typeface="Gill Sans Nova" panose="020B0602020104020203" pitchFamily="34" charset="0"/>
+              </a:rPr>
+              <a:t>Changes to either the subject or an observer will not affect the other.</a:t>
+            </a:r>
+          </a:p>
+        </p:txBody>
+      </p:sp>
+      <p:cxnSp>
+        <p:nvCxnSpPr>
+          <p:cNvPr id="10" name="Connector: Elbow 9">
+            <a:extLst>
+              <a:ext uri="{FF2B5EF4-FFF2-40B4-BE49-F238E27FC236}">
+                <a16:creationId xmlns:a16="http://schemas.microsoft.com/office/drawing/2014/main" id="{75710343-533F-431C-9870-0ECB7D1C7D16}"/>
+              </a:ext>
+            </a:extLst>
+          </p:cNvPr>
+          <p:cNvCxnSpPr>
+            <a:cxnSpLocks/>
+          </p:cNvCxnSpPr>
+          <p:nvPr/>
+        </p:nvCxnSpPr>
+        <p:spPr>
+          <a:xfrm rot="10800000">
+            <a:off x="3936608" y="2374399"/>
+            <a:ext cx="1704536" cy="864216"/>
+          </a:xfrm>
+          <a:prstGeom prst="bentConnector3">
+            <a:avLst>
+              <a:gd name="adj1" fmla="val -344"/>
+            </a:avLst>
+          </a:prstGeom>
+          <a:ln w="19050">
+            <a:tailEnd type="triangle"/>
+          </a:ln>
+        </p:spPr>
+        <p:style>
+          <a:lnRef idx="1">
+            <a:schemeClr val="dk1"/>
+          </a:lnRef>
+          <a:fillRef idx="0">
+            <a:schemeClr val="dk1"/>
+          </a:fillRef>
+          <a:effectRef idx="0">
+            <a:schemeClr val="dk1"/>
+          </a:effectRef>
+          <a:fontRef idx="minor">
+            <a:schemeClr val="tx1"/>
+          </a:fontRef>
+        </p:style>
+      </p:cxnSp>
+      <p:cxnSp>
+        <p:nvCxnSpPr>
+          <p:cNvPr id="14" name="Connector: Elbow 13">
+            <a:extLst>
+              <a:ext uri="{FF2B5EF4-FFF2-40B4-BE49-F238E27FC236}">
+                <a16:creationId xmlns:a16="http://schemas.microsoft.com/office/drawing/2014/main" id="{689B06CB-EB60-477C-B4DA-71C1510F8821}"/>
+              </a:ext>
+            </a:extLst>
+          </p:cNvPr>
+          <p:cNvCxnSpPr>
+            <a:cxnSpLocks/>
+          </p:cNvCxnSpPr>
+          <p:nvPr/>
+        </p:nvCxnSpPr>
+        <p:spPr>
+          <a:xfrm flipV="1">
+            <a:off x="6493412" y="2363373"/>
+            <a:ext cx="1733844" cy="885320"/>
+          </a:xfrm>
+          <a:prstGeom prst="bentConnector3">
+            <a:avLst>
+              <a:gd name="adj1" fmla="val -304"/>
+            </a:avLst>
+          </a:prstGeom>
+          <a:ln w="19050">
+            <a:tailEnd type="triangle"/>
+          </a:ln>
+        </p:spPr>
+        <p:style>
+          <a:lnRef idx="1">
+            <a:schemeClr val="dk1"/>
+          </a:lnRef>
+          <a:fillRef idx="0">
+            <a:schemeClr val="dk1"/>
+          </a:fillRef>
+          <a:effectRef idx="0">
+            <a:schemeClr val="dk1"/>
+          </a:effectRef>
+          <a:fontRef idx="minor">
+            <a:schemeClr val="tx1"/>
+          </a:fontRef>
+        </p:style>
+      </p:cxnSp>
+      <p:cxnSp>
+        <p:nvCxnSpPr>
+          <p:cNvPr id="17" name="Connector: Elbow 16">
+            <a:extLst>
+              <a:ext uri="{FF2B5EF4-FFF2-40B4-BE49-F238E27FC236}">
+                <a16:creationId xmlns:a16="http://schemas.microsoft.com/office/drawing/2014/main" id="{F644A34C-1043-4533-961D-C1A5CC85617A}"/>
+              </a:ext>
+            </a:extLst>
+          </p:cNvPr>
+          <p:cNvCxnSpPr>
+            <a:cxnSpLocks/>
+          </p:cNvCxnSpPr>
+          <p:nvPr/>
+        </p:nvCxnSpPr>
+        <p:spPr>
+          <a:xfrm rot="10800000" flipV="1">
+            <a:off x="3880338" y="4880856"/>
+            <a:ext cx="1760807" cy="728478"/>
+          </a:xfrm>
+          <a:prstGeom prst="bentConnector3">
+            <a:avLst>
+              <a:gd name="adj1" fmla="val -333"/>
+            </a:avLst>
+          </a:prstGeom>
+          <a:ln w="19050">
+            <a:tailEnd type="triangle"/>
+          </a:ln>
+        </p:spPr>
+        <p:style>
+          <a:lnRef idx="1">
+            <a:schemeClr val="dk1"/>
+          </a:lnRef>
+          <a:fillRef idx="0">
+            <a:schemeClr val="dk1"/>
+          </a:fillRef>
+          <a:effectRef idx="0">
+            <a:schemeClr val="dk1"/>
+          </a:effectRef>
+          <a:fontRef idx="minor">
+            <a:schemeClr val="tx1"/>
+          </a:fontRef>
+        </p:style>
+      </p:cxnSp>
+      <p:cxnSp>
+        <p:nvCxnSpPr>
+          <p:cNvPr id="20" name="Connector: Elbow 19">
+            <a:extLst>
+              <a:ext uri="{FF2B5EF4-FFF2-40B4-BE49-F238E27FC236}">
+                <a16:creationId xmlns:a16="http://schemas.microsoft.com/office/drawing/2014/main" id="{D95FAC5D-62ED-4A86-8315-14E77F9A2409}"/>
+              </a:ext>
+            </a:extLst>
+          </p:cNvPr>
+          <p:cNvCxnSpPr>
+            <a:cxnSpLocks/>
+          </p:cNvCxnSpPr>
+          <p:nvPr/>
+        </p:nvCxnSpPr>
+        <p:spPr>
+          <a:xfrm>
+            <a:off x="6493413" y="4877755"/>
+            <a:ext cx="1675226" cy="799448"/>
+          </a:xfrm>
+          <a:prstGeom prst="bentConnector3">
+            <a:avLst>
+              <a:gd name="adj1" fmla="val 1295"/>
+            </a:avLst>
+          </a:prstGeom>
+          <a:ln w="19050">
+            <a:tailEnd type="triangle"/>
+          </a:ln>
+        </p:spPr>
+        <p:style>
+          <a:lnRef idx="1">
+            <a:schemeClr val="dk1"/>
+          </a:lnRef>
+          <a:fillRef idx="0">
+            <a:schemeClr val="dk1"/>
+          </a:fillRef>
+          <a:effectRef idx="0">
+            <a:schemeClr val="dk1"/>
+          </a:effectRef>
+          <a:fontRef idx="minor">
+            <a:schemeClr val="tx1"/>
+          </a:fontRef>
+        </p:style>
+      </p:cxnSp>
+    </p:spTree>
+    <p:extLst>
+      <p:ext uri="{BB962C8B-B14F-4D97-AF65-F5344CB8AC3E}">
+        <p14:creationId xmlns:p14="http://schemas.microsoft.com/office/powerpoint/2010/main" val="1917640090"/>
+      </p:ext>
+    </p:extLst>
+  </p:cSld>
+  <p:clrMapOvr>
+    <a:masterClrMapping/>
+  </p:clrMapOvr>
+</p:sld>
+</file>
+
+<file path=ppt/slides/slide14.xml><?xml version="1.0" encoding="utf-8"?>
+<p:sld xmlns:a="http://schemas.openxmlformats.org/drawingml/2006/main" xmlns:r="http://schemas.openxmlformats.org/officeDocument/2006/relationships" xmlns:p="http://schemas.openxmlformats.org/presentationml/2006/main">
+  <p:cSld>
+    <p:spTree>
+      <p:nvGrpSpPr>
+        <p:cNvPr id="1" name=""/>
+        <p:cNvGrpSpPr/>
+        <p:nvPr/>
+      </p:nvGrpSpPr>
+      <p:grpSpPr>
+        <a:xfrm>
+          <a:off x="0" y="0"/>
+          <a:ext cx="0" cy="0"/>
+          <a:chOff x="0" y="0"/>
+          <a:chExt cx="0" cy="0"/>
+        </a:xfrm>
+      </p:grpSpPr>
+      <p:sp>
+        <p:nvSpPr>
+          <p:cNvPr id="3" name="Rectangle 2">
+            <a:extLst>
+              <a:ext uri="{FF2B5EF4-FFF2-40B4-BE49-F238E27FC236}">
+                <a16:creationId xmlns:a16="http://schemas.microsoft.com/office/drawing/2014/main" id="{79997FF2-7769-45A4-896D-F73FACBE7C47}"/>
+              </a:ext>
+            </a:extLst>
+          </p:cNvPr>
+          <p:cNvSpPr/>
+          <p:nvPr/>
+        </p:nvSpPr>
+        <p:spPr>
+          <a:xfrm>
+            <a:off x="566100" y="491421"/>
+            <a:ext cx="4673074" cy="923330"/>
+          </a:xfrm>
+          <a:prstGeom prst="rect">
+            <a:avLst/>
+          </a:prstGeom>
+          <a:noFill/>
+        </p:spPr>
+        <p:txBody>
+          <a:bodyPr wrap="none" lIns="91440" tIns="45720" rIns="91440" bIns="45720">
+            <a:spAutoFit/>
+          </a:bodyPr>
+          <a:lstStyle/>
+          <a:p>
+            <a:pPr algn="ctr"/>
+            <a:r>
+              <a:rPr lang="en-US" sz="5400" b="0" cap="none" spc="0" dirty="0">
+                <a:ln w="0"/>
+                <a:solidFill>
+                  <a:schemeClr val="tx1"/>
+                </a:solidFill>
+                <a:effectLst>
+                  <a:outerShdw blurRad="38100" dist="19050" dir="2700000" algn="tl" rotWithShape="0">
+                    <a:schemeClr val="dk1">
+                      <a:alpha val="40000"/>
+                    </a:schemeClr>
+                  </a:outerShdw>
+                </a:effectLst>
+              </a:rPr>
+              <a:t>Design Principle</a:t>
+            </a:r>
+          </a:p>
+        </p:txBody>
+      </p:sp>
+      <p:sp>
+        <p:nvSpPr>
+          <p:cNvPr id="4" name="TextBox 3">
+            <a:extLst>
+              <a:ext uri="{FF2B5EF4-FFF2-40B4-BE49-F238E27FC236}">
+                <a16:creationId xmlns:a16="http://schemas.microsoft.com/office/drawing/2014/main" id="{08A04AD3-6DB0-461D-B7E6-804FE13CE8B6}"/>
+              </a:ext>
+            </a:extLst>
+          </p:cNvPr>
+          <p:cNvSpPr txBox="1"/>
+          <p:nvPr/>
+        </p:nvSpPr>
+        <p:spPr>
+          <a:xfrm>
+            <a:off x="672903" y="1895988"/>
+            <a:ext cx="10846191" cy="461665"/>
+          </a:xfrm>
+          <a:prstGeom prst="rect">
+            <a:avLst/>
+          </a:prstGeom>
+          <a:solidFill>
+            <a:schemeClr val="bg2"/>
+          </a:solidFill>
+          <a:ln>
+            <a:solidFill>
+              <a:schemeClr val="tx1"/>
+            </a:solidFill>
+          </a:ln>
+        </p:spPr>
+        <p:txBody>
+          <a:bodyPr wrap="square" rtlCol="0">
+            <a:spAutoFit/>
+          </a:bodyPr>
+          <a:lstStyle/>
+          <a:p>
+            <a:r>
+              <a:rPr lang="en-US" sz="2400" b="1" dirty="0">
+                <a:latin typeface="Gill Sans Nova" panose="020B0604020202020204" pitchFamily="34" charset="0"/>
+              </a:rPr>
+              <a:t>Strive for loosely coupled designs between objects that interact.</a:t>
+            </a:r>
+          </a:p>
+        </p:txBody>
+      </p:sp>
+      <p:sp>
+        <p:nvSpPr>
+          <p:cNvPr id="7" name="TextBox 6">
+            <a:extLst>
+              <a:ext uri="{FF2B5EF4-FFF2-40B4-BE49-F238E27FC236}">
+                <a16:creationId xmlns:a16="http://schemas.microsoft.com/office/drawing/2014/main" id="{0BA9EC4F-E417-48AB-AD66-1C22CB116CB4}"/>
+              </a:ext>
+            </a:extLst>
+          </p:cNvPr>
+          <p:cNvSpPr txBox="1"/>
+          <p:nvPr/>
+        </p:nvSpPr>
+        <p:spPr>
+          <a:xfrm>
+            <a:off x="672903" y="2550014"/>
+            <a:ext cx="10846191" cy="1200329"/>
+          </a:xfrm>
+          <a:prstGeom prst="rect">
+            <a:avLst/>
+          </a:prstGeom>
+          <a:solidFill>
+            <a:schemeClr val="bg1"/>
+          </a:solidFill>
+          <a:ln>
+            <a:noFill/>
+          </a:ln>
+        </p:spPr>
+        <p:txBody>
+          <a:bodyPr wrap="square" rtlCol="0">
+            <a:spAutoFit/>
+          </a:bodyPr>
+          <a:lstStyle/>
+          <a:p>
+            <a:r>
+              <a:rPr lang="en-GB" sz="2400" b="1" dirty="0">
+                <a:latin typeface="Gill Sans Nova" panose="020B0604020202020204" pitchFamily="34" charset="0"/>
+              </a:rPr>
+              <a:t>Loosely coupled designs allow us to build ﬂexible Object-Oriented systems that can handle change because they minimize the interdependency between objects.</a:t>
+            </a:r>
+            <a:endParaRPr lang="en-US" sz="2400" b="1" dirty="0">
+              <a:latin typeface="Gill Sans Nova" panose="020B0604020202020204" pitchFamily="34" charset="0"/>
+            </a:endParaRPr>
+          </a:p>
+        </p:txBody>
+      </p:sp>
+    </p:spTree>
+    <p:extLst>
+      <p:ext uri="{BB962C8B-B14F-4D97-AF65-F5344CB8AC3E}">
+        <p14:creationId xmlns:p14="http://schemas.microsoft.com/office/powerpoint/2010/main" val="1333521232"/>
+      </p:ext>
+    </p:extLst>
+  </p:cSld>
+  <p:clrMapOvr>
+    <a:masterClrMapping/>
+  </p:clrMapOvr>
+</p:sld>
+</file>
+
+<file path=ppt/slides/slide15.xml><?xml version="1.0" encoding="utf-8"?>
+<p:sld xmlns:a="http://schemas.openxmlformats.org/drawingml/2006/main" xmlns:r="http://schemas.openxmlformats.org/officeDocument/2006/relationships" xmlns:p="http://schemas.openxmlformats.org/presentationml/2006/main">
+  <p:cSld>
+    <p:spTree>
+      <p:nvGrpSpPr>
+        <p:cNvPr id="1" name=""/>
+        <p:cNvGrpSpPr/>
+        <p:nvPr/>
+      </p:nvGrpSpPr>
+      <p:grpSpPr>
+        <a:xfrm>
+          <a:off x="0" y="0"/>
+          <a:ext cx="0" cy="0"/>
+          <a:chOff x="0" y="0"/>
+          <a:chExt cx="0" cy="0"/>
+        </a:xfrm>
+      </p:grpSpPr>
+      <p:sp>
+        <p:nvSpPr>
+          <p:cNvPr id="3" name="Rectangle 2">
+            <a:extLst>
+              <a:ext uri="{FF2B5EF4-FFF2-40B4-BE49-F238E27FC236}">
+                <a16:creationId xmlns:a16="http://schemas.microsoft.com/office/drawing/2014/main" id="{79997FF2-7769-45A4-896D-F73FACBE7C47}"/>
+              </a:ext>
+            </a:extLst>
+          </p:cNvPr>
+          <p:cNvSpPr/>
+          <p:nvPr/>
+        </p:nvSpPr>
+        <p:spPr>
+          <a:xfrm>
+            <a:off x="396714" y="0"/>
+            <a:ext cx="4983480" cy="923330"/>
+          </a:xfrm>
+          <a:prstGeom prst="rect">
+            <a:avLst/>
+          </a:prstGeom>
+          <a:noFill/>
+        </p:spPr>
+        <p:txBody>
+          <a:bodyPr wrap="none" lIns="91440" tIns="45720" rIns="91440" bIns="45720">
+            <a:spAutoFit/>
+          </a:bodyPr>
+          <a:lstStyle/>
+          <a:p>
+            <a:pPr algn="ctr"/>
+            <a:r>
+              <a:rPr lang="en-US" sz="5400" b="0" cap="none" spc="0" dirty="0">
+                <a:ln w="0"/>
+                <a:solidFill>
+                  <a:schemeClr val="tx1"/>
+                </a:solidFill>
+                <a:effectLst>
+                  <a:outerShdw blurRad="38100" dist="19050" dir="2700000" algn="tl" rotWithShape="0">
+                    <a:schemeClr val="dk1">
+                      <a:alpha val="40000"/>
+                    </a:schemeClr>
+                  </a:outerShdw>
+                </a:effectLst>
+              </a:rPr>
+              <a:t>Observer Pattern</a:t>
+            </a:r>
+          </a:p>
+        </p:txBody>
+      </p:sp>
+      <p:pic>
+        <p:nvPicPr>
+          <p:cNvPr id="2" name="Picture 1">
+            <a:extLst>
+              <a:ext uri="{FF2B5EF4-FFF2-40B4-BE49-F238E27FC236}">
+                <a16:creationId xmlns:a16="http://schemas.microsoft.com/office/drawing/2014/main" id="{D073E078-016E-451C-B620-3F3B32E05793}"/>
+              </a:ext>
+            </a:extLst>
+          </p:cNvPr>
+          <p:cNvPicPr>
+            <a:picLocks noChangeAspect="1"/>
+          </p:cNvPicPr>
+          <p:nvPr/>
+        </p:nvPicPr>
+        <p:blipFill>
+          <a:blip r:embed="rId2"/>
+          <a:stretch>
+            <a:fillRect/>
+          </a:stretch>
+        </p:blipFill>
+        <p:spPr>
+          <a:xfrm>
+            <a:off x="692136" y="923330"/>
+            <a:ext cx="10400643" cy="5891432"/>
+          </a:xfrm>
+          <a:prstGeom prst="rect">
+            <a:avLst/>
+          </a:prstGeom>
+        </p:spPr>
+      </p:pic>
+    </p:spTree>
+    <p:extLst>
+      <p:ext uri="{BB962C8B-B14F-4D97-AF65-F5344CB8AC3E}">
+        <p14:creationId xmlns:p14="http://schemas.microsoft.com/office/powerpoint/2010/main" val="1245523353"/>
+      </p:ext>
+    </p:extLst>
+  </p:cSld>
+  <p:clrMapOvr>
+    <a:masterClrMapping/>
+  </p:clrMapOvr>
+</p:sld>
+</file>
+
 <file path=ppt/slides/slide2.xml><?xml version="1.0" encoding="utf-8"?>
 <p:sld xmlns:a="http://schemas.openxmlformats.org/drawingml/2006/main" xmlns:r="http://schemas.openxmlformats.org/officeDocument/2006/relationships" xmlns:p="http://schemas.openxmlformats.org/presentationml/2006/main">
   <p:cSld>
@@ -4056,7 +5214,7 @@
         </p:nvSpPr>
         <p:spPr>
           <a:xfrm>
-            <a:off x="731520" y="1842868"/>
+            <a:off x="672904" y="2953270"/>
             <a:ext cx="10846191" cy="461665"/>
           </a:xfrm>
           <a:prstGeom prst="rect">
@@ -4100,7 +5258,7 @@
         </p:nvSpPr>
         <p:spPr>
           <a:xfrm>
-            <a:off x="731519" y="2828495"/>
+            <a:off x="672904" y="3635264"/>
             <a:ext cx="10846191" cy="1569660"/>
           </a:xfrm>
           <a:prstGeom prst="rect">
@@ -4136,6 +5294,116 @@
                 <a:latin typeface="Gill Sans Nova" panose="020B0604020202020204" pitchFamily="34" charset="0"/>
               </a:rPr>
               <a:t> as long as the object you’re composing with implements the correct behavior interface.</a:t>
+            </a:r>
+          </a:p>
+        </p:txBody>
+      </p:sp>
+      <p:sp>
+        <p:nvSpPr>
+          <p:cNvPr id="6" name="TextBox 5">
+            <a:extLst>
+              <a:ext uri="{FF2B5EF4-FFF2-40B4-BE49-F238E27FC236}">
+                <a16:creationId xmlns:a16="http://schemas.microsoft.com/office/drawing/2014/main" id="{E5916A06-3055-454B-A2DB-2B24CDC03A8E}"/>
+              </a:ext>
+            </a:extLst>
+          </p:cNvPr>
+          <p:cNvSpPr txBox="1"/>
+          <p:nvPr/>
+        </p:nvSpPr>
+        <p:spPr>
+          <a:xfrm>
+            <a:off x="672904" y="1653076"/>
+            <a:ext cx="10846191" cy="1200329"/>
+          </a:xfrm>
+          <a:prstGeom prst="rect">
+            <a:avLst/>
+          </a:prstGeom>
+          <a:solidFill>
+            <a:schemeClr val="bg1"/>
+          </a:solidFill>
+          <a:ln>
+            <a:noFill/>
+          </a:ln>
+        </p:spPr>
+        <p:txBody>
+          <a:bodyPr wrap="square" rtlCol="0">
+            <a:spAutoFit/>
+          </a:bodyPr>
+          <a:lstStyle/>
+          <a:p>
+            <a:r>
+              <a:rPr lang="en-US" sz="2400" b="1" u="sng" dirty="0">
+                <a:latin typeface="Gill Sans Nova" panose="020B0604020202020204" pitchFamily="34" charset="0"/>
+              </a:rPr>
+              <a:t>HAS-A is better than IS-A</a:t>
+            </a:r>
+          </a:p>
+          <a:p>
+            <a:r>
+              <a:rPr lang="en-US" sz="2400" dirty="0">
+                <a:latin typeface="Gill Sans Nova" panose="020B0604020202020204" pitchFamily="34" charset="0"/>
+              </a:rPr>
+              <a:t>Each </a:t>
+            </a:r>
+            <a:r>
+              <a:rPr lang="en-US" sz="2400" b="1" i="1" dirty="0">
+                <a:latin typeface="Gill Sans Nova" panose="020B0604020202020204" pitchFamily="34" charset="0"/>
+              </a:rPr>
+              <a:t>Duck</a:t>
+            </a:r>
+            <a:r>
+              <a:rPr lang="en-US" sz="2400" dirty="0">
+                <a:latin typeface="Gill Sans Nova" panose="020B0604020202020204" pitchFamily="34" charset="0"/>
+              </a:rPr>
+              <a:t> has a </a:t>
+            </a:r>
+            <a:r>
+              <a:rPr lang="en-US" sz="2400" b="1" i="1" dirty="0">
+                <a:latin typeface="Gill Sans Nova" panose="020B0604020202020204" pitchFamily="34" charset="0"/>
+              </a:rPr>
+              <a:t>FlyBehavior</a:t>
+            </a:r>
+            <a:r>
+              <a:rPr lang="en-US" sz="2400" dirty="0">
+                <a:latin typeface="Gill Sans Nova" panose="020B0604020202020204" pitchFamily="34" charset="0"/>
+              </a:rPr>
+              <a:t> and a </a:t>
+            </a:r>
+            <a:r>
+              <a:rPr lang="en-US" sz="2400" b="1" i="1" dirty="0">
+                <a:latin typeface="Gill Sans Nova" panose="020B0604020202020204" pitchFamily="34" charset="0"/>
+              </a:rPr>
+              <a:t>QuackBehavior. </a:t>
+            </a:r>
+            <a:r>
+              <a:rPr lang="en-US" sz="2400" dirty="0">
+                <a:latin typeface="Gill Sans Nova" panose="020B0604020202020204" pitchFamily="34" charset="0"/>
+              </a:rPr>
+              <a:t>Instead of using </a:t>
+            </a:r>
+            <a:r>
+              <a:rPr lang="en-US" sz="2400" i="1" dirty="0">
+                <a:latin typeface="Gill Sans Nova" panose="020B0604020202020204" pitchFamily="34" charset="0"/>
+              </a:rPr>
+              <a:t>inheritance</a:t>
+            </a:r>
+            <a:r>
+              <a:rPr lang="en-US" sz="2400" dirty="0">
+                <a:latin typeface="Gill Sans Nova" panose="020B0604020202020204" pitchFamily="34" charset="0"/>
+              </a:rPr>
+              <a:t>, we’re using </a:t>
+            </a:r>
+            <a:r>
+              <a:rPr lang="en-US" sz="2400" i="1" dirty="0">
+                <a:latin typeface="Gill Sans Nova" panose="020B0604020202020204" pitchFamily="34" charset="0"/>
+              </a:rPr>
+              <a:t>composition</a:t>
+            </a:r>
+            <a:r>
+              <a:rPr lang="en-US" sz="2400" dirty="0">
+                <a:latin typeface="Gill Sans Nova" panose="020B0604020202020204" pitchFamily="34" charset="0"/>
+              </a:rPr>
+              <a:t>. </a:t>
             </a:r>
           </a:p>
         </p:txBody>
@@ -4419,6 +5687,440 @@
     <p:extLst>
       <p:ext uri="{BB962C8B-B14F-4D97-AF65-F5344CB8AC3E}">
         <p14:creationId xmlns:p14="http://schemas.microsoft.com/office/powerpoint/2010/main" val="3723971357"/>
+      </p:ext>
+    </p:extLst>
+  </p:cSld>
+  <p:clrMapOvr>
+    <a:masterClrMapping/>
+  </p:clrMapOvr>
+</p:sld>
+</file>
+
+<file path=ppt/slides/slide7.xml><?xml version="1.0" encoding="utf-8"?>
+<p:sld xmlns:a="http://schemas.openxmlformats.org/drawingml/2006/main" xmlns:r="http://schemas.openxmlformats.org/officeDocument/2006/relationships" xmlns:p="http://schemas.openxmlformats.org/presentationml/2006/main">
+  <p:cSld>
+    <p:spTree>
+      <p:nvGrpSpPr>
+        <p:cNvPr id="1" name=""/>
+        <p:cNvGrpSpPr/>
+        <p:nvPr/>
+      </p:nvGrpSpPr>
+      <p:grpSpPr>
+        <a:xfrm>
+          <a:off x="0" y="0"/>
+          <a:ext cx="0" cy="0"/>
+          <a:chOff x="0" y="0"/>
+          <a:chExt cx="0" cy="0"/>
+        </a:xfrm>
+      </p:grpSpPr>
+      <p:pic>
+        <p:nvPicPr>
+          <p:cNvPr id="2" name="Picture 1">
+            <a:extLst>
+              <a:ext uri="{FF2B5EF4-FFF2-40B4-BE49-F238E27FC236}">
+                <a16:creationId xmlns:a16="http://schemas.microsoft.com/office/drawing/2014/main" id="{81FBA759-FADA-41DD-9FFB-5A029BEE9A77}"/>
+              </a:ext>
+            </a:extLst>
+          </p:cNvPr>
+          <p:cNvPicPr>
+            <a:picLocks noChangeAspect="1"/>
+          </p:cNvPicPr>
+          <p:nvPr/>
+        </p:nvPicPr>
+        <p:blipFill>
+          <a:blip r:embed="rId2"/>
+          <a:stretch>
+            <a:fillRect/>
+          </a:stretch>
+        </p:blipFill>
+        <p:spPr>
+          <a:xfrm>
+            <a:off x="4797083" y="1414751"/>
+            <a:ext cx="7238047" cy="5107653"/>
+          </a:xfrm>
+          <a:prstGeom prst="rect">
+            <a:avLst/>
+          </a:prstGeom>
+        </p:spPr>
+      </p:pic>
+      <p:sp>
+        <p:nvSpPr>
+          <p:cNvPr id="3" name="Rectangle 2">
+            <a:extLst>
+              <a:ext uri="{FF2B5EF4-FFF2-40B4-BE49-F238E27FC236}">
+                <a16:creationId xmlns:a16="http://schemas.microsoft.com/office/drawing/2014/main" id="{0A07BF98-BFAC-4EB3-8EF0-9B3C05073DF1}"/>
+              </a:ext>
+            </a:extLst>
+          </p:cNvPr>
+          <p:cNvSpPr/>
+          <p:nvPr/>
+        </p:nvSpPr>
+        <p:spPr>
+          <a:xfrm>
+            <a:off x="410900" y="491421"/>
+            <a:ext cx="4983480" cy="923330"/>
+          </a:xfrm>
+          <a:prstGeom prst="rect">
+            <a:avLst/>
+          </a:prstGeom>
+          <a:noFill/>
+        </p:spPr>
+        <p:txBody>
+          <a:bodyPr wrap="none" lIns="91440" tIns="45720" rIns="91440" bIns="45720">
+            <a:spAutoFit/>
+          </a:bodyPr>
+          <a:lstStyle/>
+          <a:p>
+            <a:pPr algn="ctr"/>
+            <a:r>
+              <a:rPr lang="en-US" sz="5400" b="0" cap="none" spc="0" dirty="0">
+                <a:ln w="0"/>
+                <a:solidFill>
+                  <a:schemeClr val="tx1"/>
+                </a:solidFill>
+                <a:effectLst>
+                  <a:outerShdw blurRad="38100" dist="19050" dir="2700000" algn="tl" rotWithShape="0">
+                    <a:schemeClr val="dk1">
+                      <a:alpha val="40000"/>
+                    </a:schemeClr>
+                  </a:outerShdw>
+                </a:effectLst>
+              </a:rPr>
+              <a:t>Observer Pattern</a:t>
+            </a:r>
+          </a:p>
+        </p:txBody>
+      </p:sp>
+      <p:sp>
+        <p:nvSpPr>
+          <p:cNvPr id="4" name="TextBox 3">
+            <a:extLst>
+              <a:ext uri="{FF2B5EF4-FFF2-40B4-BE49-F238E27FC236}">
+                <a16:creationId xmlns:a16="http://schemas.microsoft.com/office/drawing/2014/main" id="{173EE0B3-0F5A-4A51-8B22-DDFE1BED5B12}"/>
+              </a:ext>
+            </a:extLst>
+          </p:cNvPr>
+          <p:cNvSpPr txBox="1"/>
+          <p:nvPr/>
+        </p:nvSpPr>
+        <p:spPr>
+          <a:xfrm>
+            <a:off x="647115" y="1617785"/>
+            <a:ext cx="4149968" cy="2308324"/>
+          </a:xfrm>
+          <a:prstGeom prst="rect">
+            <a:avLst/>
+          </a:prstGeom>
+          <a:solidFill>
+            <a:schemeClr val="bg1"/>
+          </a:solidFill>
+          <a:ln>
+            <a:noFill/>
+          </a:ln>
+        </p:spPr>
+        <p:txBody>
+          <a:bodyPr wrap="square" rtlCol="0">
+            <a:spAutoFit/>
+          </a:bodyPr>
+          <a:lstStyle/>
+          <a:p>
+            <a:r>
+              <a:rPr lang="en-US" sz="2400" b="1" u="sng" dirty="0">
+                <a:latin typeface="Gill Sans Nova" panose="020B0604020202020204" pitchFamily="34" charset="0"/>
+              </a:rPr>
+              <a:t>Publishers + Subscribers</a:t>
+            </a:r>
+          </a:p>
+          <a:p>
+            <a:r>
+              <a:rPr lang="en-US" sz="2400" dirty="0">
+                <a:latin typeface="Gill Sans Nova" panose="020B0604020202020204" pitchFamily="34" charset="0"/>
+              </a:rPr>
+              <a:t>Object Pattern is comparable to newspaper subscriptions. We call the publisher the SUBJECT, and the subscribers the OBSERVERS.</a:t>
+            </a:r>
+          </a:p>
+        </p:txBody>
+      </p:sp>
+    </p:spTree>
+    <p:extLst>
+      <p:ext uri="{BB962C8B-B14F-4D97-AF65-F5344CB8AC3E}">
+        <p14:creationId xmlns:p14="http://schemas.microsoft.com/office/powerpoint/2010/main" val="2741668914"/>
+      </p:ext>
+    </p:extLst>
+  </p:cSld>
+  <p:clrMapOvr>
+    <a:masterClrMapping/>
+  </p:clrMapOvr>
+</p:sld>
+</file>
+
+<file path=ppt/slides/slide8.xml><?xml version="1.0" encoding="utf-8"?>
+<p:sld xmlns:a="http://schemas.openxmlformats.org/drawingml/2006/main" xmlns:r="http://schemas.openxmlformats.org/officeDocument/2006/relationships" xmlns:p="http://schemas.openxmlformats.org/presentationml/2006/main">
+  <p:cSld>
+    <p:spTree>
+      <p:nvGrpSpPr>
+        <p:cNvPr id="1" name=""/>
+        <p:cNvGrpSpPr/>
+        <p:nvPr/>
+      </p:nvGrpSpPr>
+      <p:grpSpPr>
+        <a:xfrm>
+          <a:off x="0" y="0"/>
+          <a:ext cx="0" cy="0"/>
+          <a:chOff x="0" y="0"/>
+          <a:chExt cx="0" cy="0"/>
+        </a:xfrm>
+      </p:grpSpPr>
+      <p:sp>
+        <p:nvSpPr>
+          <p:cNvPr id="3" name="Rectangle 2">
+            <a:extLst>
+              <a:ext uri="{FF2B5EF4-FFF2-40B4-BE49-F238E27FC236}">
+                <a16:creationId xmlns:a16="http://schemas.microsoft.com/office/drawing/2014/main" id="{0A07BF98-BFAC-4EB3-8EF0-9B3C05073DF1}"/>
+              </a:ext>
+            </a:extLst>
+          </p:cNvPr>
+          <p:cNvSpPr/>
+          <p:nvPr/>
+        </p:nvSpPr>
+        <p:spPr>
+          <a:xfrm>
+            <a:off x="410900" y="491421"/>
+            <a:ext cx="4983480" cy="923330"/>
+          </a:xfrm>
+          <a:prstGeom prst="rect">
+            <a:avLst/>
+          </a:prstGeom>
+          <a:noFill/>
+        </p:spPr>
+        <p:txBody>
+          <a:bodyPr wrap="none" lIns="91440" tIns="45720" rIns="91440" bIns="45720">
+            <a:spAutoFit/>
+          </a:bodyPr>
+          <a:lstStyle/>
+          <a:p>
+            <a:pPr algn="ctr"/>
+            <a:r>
+              <a:rPr lang="en-US" sz="5400" b="0" cap="none" spc="0" dirty="0">
+                <a:ln w="0"/>
+                <a:solidFill>
+                  <a:schemeClr val="tx1"/>
+                </a:solidFill>
+                <a:effectLst>
+                  <a:outerShdw blurRad="38100" dist="19050" dir="2700000" algn="tl" rotWithShape="0">
+                    <a:schemeClr val="dk1">
+                      <a:alpha val="40000"/>
+                    </a:schemeClr>
+                  </a:outerShdw>
+                </a:effectLst>
+              </a:rPr>
+              <a:t>Observer Pattern</a:t>
+            </a:r>
+          </a:p>
+        </p:txBody>
+      </p:sp>
+      <p:pic>
+        <p:nvPicPr>
+          <p:cNvPr id="5" name="Picture 4">
+            <a:extLst>
+              <a:ext uri="{FF2B5EF4-FFF2-40B4-BE49-F238E27FC236}">
+                <a16:creationId xmlns:a16="http://schemas.microsoft.com/office/drawing/2014/main" id="{97C739CA-6882-4BD5-8CB2-90F571CC3E3F}"/>
+              </a:ext>
+            </a:extLst>
+          </p:cNvPr>
+          <p:cNvPicPr>
+            <a:picLocks noChangeAspect="1"/>
+          </p:cNvPicPr>
+          <p:nvPr/>
+        </p:nvPicPr>
+        <p:blipFill>
+          <a:blip r:embed="rId2"/>
+          <a:stretch>
+            <a:fillRect/>
+          </a:stretch>
+        </p:blipFill>
+        <p:spPr>
+          <a:xfrm>
+            <a:off x="1744395" y="1414751"/>
+            <a:ext cx="8240632" cy="5291813"/>
+          </a:xfrm>
+          <a:prstGeom prst="rect">
+            <a:avLst/>
+          </a:prstGeom>
+        </p:spPr>
+      </p:pic>
+    </p:spTree>
+    <p:extLst>
+      <p:ext uri="{BB962C8B-B14F-4D97-AF65-F5344CB8AC3E}">
+        <p14:creationId xmlns:p14="http://schemas.microsoft.com/office/powerpoint/2010/main" val="3198193305"/>
+      </p:ext>
+    </p:extLst>
+  </p:cSld>
+  <p:clrMapOvr>
+    <a:masterClrMapping/>
+  </p:clrMapOvr>
+</p:sld>
+</file>
+
+<file path=ppt/slides/slide9.xml><?xml version="1.0" encoding="utf-8"?>
+<p:sld xmlns:a="http://schemas.openxmlformats.org/drawingml/2006/main" xmlns:r="http://schemas.openxmlformats.org/officeDocument/2006/relationships" xmlns:p="http://schemas.openxmlformats.org/presentationml/2006/main">
+  <p:cSld>
+    <p:spTree>
+      <p:nvGrpSpPr>
+        <p:cNvPr id="1" name=""/>
+        <p:cNvGrpSpPr/>
+        <p:nvPr/>
+      </p:nvGrpSpPr>
+      <p:grpSpPr>
+        <a:xfrm>
+          <a:off x="0" y="0"/>
+          <a:ext cx="0" cy="0"/>
+          <a:chOff x="0" y="0"/>
+          <a:chExt cx="0" cy="0"/>
+        </a:xfrm>
+      </p:grpSpPr>
+      <p:sp>
+        <p:nvSpPr>
+          <p:cNvPr id="3" name="Rectangle 2">
+            <a:extLst>
+              <a:ext uri="{FF2B5EF4-FFF2-40B4-BE49-F238E27FC236}">
+                <a16:creationId xmlns:a16="http://schemas.microsoft.com/office/drawing/2014/main" id="{0A07BF98-BFAC-4EB3-8EF0-9B3C05073DF1}"/>
+              </a:ext>
+            </a:extLst>
+          </p:cNvPr>
+          <p:cNvSpPr/>
+          <p:nvPr/>
+        </p:nvSpPr>
+        <p:spPr>
+          <a:xfrm>
+            <a:off x="410900" y="491421"/>
+            <a:ext cx="4983480" cy="923330"/>
+          </a:xfrm>
+          <a:prstGeom prst="rect">
+            <a:avLst/>
+          </a:prstGeom>
+          <a:noFill/>
+        </p:spPr>
+        <p:txBody>
+          <a:bodyPr wrap="none" lIns="91440" tIns="45720" rIns="91440" bIns="45720">
+            <a:spAutoFit/>
+          </a:bodyPr>
+          <a:lstStyle/>
+          <a:p>
+            <a:pPr algn="ctr"/>
+            <a:r>
+              <a:rPr lang="en-US" sz="5400" b="0" cap="none" spc="0" dirty="0">
+                <a:ln w="0"/>
+                <a:solidFill>
+                  <a:schemeClr val="tx1"/>
+                </a:solidFill>
+                <a:effectLst>
+                  <a:outerShdw blurRad="38100" dist="19050" dir="2700000" algn="tl" rotWithShape="0">
+                    <a:schemeClr val="dk1">
+                      <a:alpha val="40000"/>
+                    </a:schemeClr>
+                  </a:outerShdw>
+                </a:effectLst>
+              </a:rPr>
+              <a:t>Observer Pattern</a:t>
+            </a:r>
+          </a:p>
+        </p:txBody>
+      </p:sp>
+      <p:pic>
+        <p:nvPicPr>
+          <p:cNvPr id="2" name="Picture 1">
+            <a:extLst>
+              <a:ext uri="{FF2B5EF4-FFF2-40B4-BE49-F238E27FC236}">
+                <a16:creationId xmlns:a16="http://schemas.microsoft.com/office/drawing/2014/main" id="{875E2276-EC84-420D-A7CF-1420D60677CA}"/>
+              </a:ext>
+            </a:extLst>
+          </p:cNvPr>
+          <p:cNvPicPr>
+            <a:picLocks noChangeAspect="1"/>
+          </p:cNvPicPr>
+          <p:nvPr/>
+        </p:nvPicPr>
+        <p:blipFill>
+          <a:blip r:embed="rId2"/>
+          <a:stretch>
+            <a:fillRect/>
+          </a:stretch>
+        </p:blipFill>
+        <p:spPr>
+          <a:xfrm>
+            <a:off x="2460445" y="1414751"/>
+            <a:ext cx="7271110" cy="2537093"/>
+          </a:xfrm>
+          <a:prstGeom prst="rect">
+            <a:avLst/>
+          </a:prstGeom>
+        </p:spPr>
+      </p:pic>
+      <p:pic>
+        <p:nvPicPr>
+          <p:cNvPr id="4" name="Picture 3">
+            <a:extLst>
+              <a:ext uri="{FF2B5EF4-FFF2-40B4-BE49-F238E27FC236}">
+                <a16:creationId xmlns:a16="http://schemas.microsoft.com/office/drawing/2014/main" id="{F36B8737-C39D-4091-8614-69C96A757843}"/>
+              </a:ext>
+            </a:extLst>
+          </p:cNvPr>
+          <p:cNvPicPr>
+            <a:picLocks noChangeAspect="1"/>
+          </p:cNvPicPr>
+          <p:nvPr/>
+        </p:nvPicPr>
+        <p:blipFill>
+          <a:blip r:embed="rId3"/>
+          <a:stretch>
+            <a:fillRect/>
+          </a:stretch>
+        </p:blipFill>
+        <p:spPr>
+          <a:xfrm>
+            <a:off x="2460445" y="3951844"/>
+            <a:ext cx="7271110" cy="2808960"/>
+          </a:xfrm>
+          <a:prstGeom prst="rect">
+            <a:avLst/>
+          </a:prstGeom>
+        </p:spPr>
+      </p:pic>
+      <p:pic>
+        <p:nvPicPr>
+          <p:cNvPr id="6" name="Picture 5">
+            <a:extLst>
+              <a:ext uri="{FF2B5EF4-FFF2-40B4-BE49-F238E27FC236}">
+                <a16:creationId xmlns:a16="http://schemas.microsoft.com/office/drawing/2014/main" id="{6F77B3D6-9F14-441E-B2BE-BF2115F9B964}"/>
+              </a:ext>
+            </a:extLst>
+          </p:cNvPr>
+          <p:cNvPicPr>
+            <a:picLocks noChangeAspect="1"/>
+          </p:cNvPicPr>
+          <p:nvPr/>
+        </p:nvPicPr>
+        <p:blipFill>
+          <a:blip r:embed="rId4"/>
+          <a:stretch>
+            <a:fillRect/>
+          </a:stretch>
+        </p:blipFill>
+        <p:spPr>
+          <a:xfrm>
+            <a:off x="2460445" y="3864770"/>
+            <a:ext cx="7271110" cy="201975"/>
+          </a:xfrm>
+          <a:prstGeom prst="rect">
+            <a:avLst/>
+          </a:prstGeom>
+        </p:spPr>
+      </p:pic>
+    </p:spTree>
+    <p:extLst>
+      <p:ext uri="{BB962C8B-B14F-4D97-AF65-F5344CB8AC3E}">
+        <p14:creationId xmlns:p14="http://schemas.microsoft.com/office/powerpoint/2010/main" val="1859219455"/>
       </p:ext>
     </p:extLst>
   </p:cSld>

</xml_diff>